<commit_message>
Updated some diagrams and finalized the first pass at a poster.
Relates to xwsxethan/MusicScoring#58
</commit_message>
<xml_diff>
--- a/Documents/Poster/IRD_Poster01.pptx
+++ b/Documents/Poster/IRD_Poster01.pptx
@@ -7656,10 +7656,6 @@
               <a:rPr lang="en-US" sz="8000" dirty="0" smtClean="0"/>
               <a:t>Paradigms</a:t>
             </a:r>
-            <a:r>
-              <a:rPr lang="en-US" sz="8000" dirty="0" smtClean="0"/>
-              <a:t> </a:t>
-            </a:r>
             <a:endParaRPr lang="en-US" sz="8000" dirty="0" smtClean="0"/>
           </a:p>
           <a:p>
@@ -8184,6 +8180,70 @@
           </a:graphicData>
         </a:graphic>
       </p:graphicFrame>
+      <p:pic>
+        <p:nvPicPr>
+          <p:cNvPr id="3" name="Picture 2" descr="Scorer - Page-1.png"/>
+          <p:cNvPicPr>
+            <a:picLocks noChangeAspect="1"/>
+          </p:cNvPicPr>
+          <p:nvPr/>
+        </p:nvPicPr>
+        <p:blipFill rotWithShape="1">
+          <a:blip r:embed="rId9" cstate="print">
+            <a:extLst>
+              <a:ext uri="{28A0092B-C50C-407E-A947-70E740481C1C}">
+                <a14:useLocalDpi xmlns:a14="http://schemas.microsoft.com/office/drawing/2010/main" val="0"/>
+              </a:ext>
+            </a:extLst>
+          </a:blip>
+          <a:srcRect l="14160" t="20117" r="5776" b="19695"/>
+          <a:stretch/>
+        </p:blipFill>
+        <p:spPr>
+          <a:xfrm>
+            <a:off x="12578406" y="16680138"/>
+            <a:ext cx="11618796" cy="11303545"/>
+          </a:xfrm>
+          <a:prstGeom prst="rect">
+            <a:avLst/>
+          </a:prstGeom>
+          <a:solidFill>
+            <a:schemeClr val="bg1"/>
+          </a:solidFill>
+        </p:spPr>
+      </p:pic>
+      <p:pic>
+        <p:nvPicPr>
+          <p:cNvPr id="4" name="Picture 3" descr="Future Plan - New Page.png"/>
+          <p:cNvPicPr>
+            <a:picLocks noChangeAspect="1"/>
+          </p:cNvPicPr>
+          <p:nvPr/>
+        </p:nvPicPr>
+        <p:blipFill rotWithShape="1">
+          <a:blip r:embed="rId10" cstate="print">
+            <a:extLst>
+              <a:ext uri="{28A0092B-C50C-407E-A947-70E740481C1C}">
+                <a14:useLocalDpi xmlns:a14="http://schemas.microsoft.com/office/drawing/2010/main" val="0"/>
+              </a:ext>
+            </a:extLst>
+          </a:blip>
+          <a:srcRect l="31961" t="8475" r="25918" b="38497"/>
+          <a:stretch/>
+        </p:blipFill>
+        <p:spPr>
+          <a:xfrm>
+            <a:off x="25061872" y="16682447"/>
+            <a:ext cx="6925194" cy="11282686"/>
+          </a:xfrm>
+          <a:prstGeom prst="rect">
+            <a:avLst/>
+          </a:prstGeom>
+          <a:solidFill>
+            <a:schemeClr val="bg1"/>
+          </a:solidFill>
+        </p:spPr>
+      </p:pic>
     </p:spTree>
     <p:extLst>
       <p:ext uri="{BB962C8B-B14F-4D97-AF65-F5344CB8AC3E}">

</xml_diff>